<commit_message>
index file update and presentation content added
</commit_message>
<xml_diff>
--- a/Project-3 Slide Deck.pptx
+++ b/Project-3 Slide Deck.pptx
@@ -599,6 +599,90 @@
 </p:notes>
 </file>
 
+<file path=ppt/notesSlides/notesSlide10.xml><?xml version="1.0" encoding="utf-8"?>
+<p:notes xmlns:a="http://schemas.openxmlformats.org/drawingml/2006/main" xmlns:r="http://schemas.openxmlformats.org/officeDocument/2006/relationships" xmlns:p="http://schemas.openxmlformats.org/presentationml/2006/main">
+  <p:cSld>
+    <p:spTree>
+      <p:nvGrpSpPr>
+        <p:cNvPr id="1" name=""/>
+        <p:cNvGrpSpPr/>
+        <p:nvPr/>
+      </p:nvGrpSpPr>
+      <p:grpSpPr>
+        <a:xfrm>
+          <a:off x="0" y="0"/>
+          <a:ext cx="0" cy="0"/>
+          <a:chOff x="0" y="0"/>
+          <a:chExt cx="0" cy="0"/>
+        </a:xfrm>
+      </p:grpSpPr>
+      <p:sp>
+        <p:nvSpPr>
+          <p:cNvPr id="2" name="Slide Image Placeholder 1"/>
+          <p:cNvSpPr>
+            <a:spLocks noGrp="1" noRot="1" noChangeAspect="1"/>
+          </p:cNvSpPr>
+          <p:nvPr>
+            <p:ph type="sldImg"/>
+          </p:nvPr>
+        </p:nvSpPr>
+        <p:spPr/>
+      </p:sp>
+      <p:sp>
+        <p:nvSpPr>
+          <p:cNvPr id="3" name="Notes Placeholder 2"/>
+          <p:cNvSpPr>
+            <a:spLocks noGrp="1"/>
+          </p:cNvSpPr>
+          <p:nvPr>
+            <p:ph type="body" idx="1"/>
+          </p:nvPr>
+        </p:nvSpPr>
+        <p:spPr/>
+        <p:txBody>
+          <a:bodyPr/>
+          <a:lstStyle/>
+          <a:p>
+            <a:endParaRPr lang="en-GB" dirty="0"/>
+          </a:p>
+        </p:txBody>
+      </p:sp>
+      <p:sp>
+        <p:nvSpPr>
+          <p:cNvPr id="4" name="Slide Number Placeholder 3"/>
+          <p:cNvSpPr>
+            <a:spLocks noGrp="1"/>
+          </p:cNvSpPr>
+          <p:nvPr>
+            <p:ph type="sldNum" sz="quarter" idx="5"/>
+          </p:nvPr>
+        </p:nvSpPr>
+        <p:spPr/>
+        <p:txBody>
+          <a:bodyPr/>
+          <a:lstStyle/>
+          <a:p>
+            <a:fld id="{06F0EE7B-22F6-468D-A434-EC27BE18C34A}" type="slidenum">
+              <a:rPr lang="en-GB" smtClean="0"/>
+              <a:t>10</a:t>
+            </a:fld>
+            <a:endParaRPr lang="en-GB"/>
+          </a:p>
+        </p:txBody>
+      </p:sp>
+    </p:spTree>
+    <p:extLst>
+      <p:ext uri="{BB962C8B-B14F-4D97-AF65-F5344CB8AC3E}">
+        <p14:creationId xmlns:p14="http://schemas.microsoft.com/office/powerpoint/2010/main" val="3626193129"/>
+      </p:ext>
+    </p:extLst>
+  </p:cSld>
+  <p:clrMapOvr>
+    <a:masterClrMapping/>
+  </p:clrMapOvr>
+</p:notes>
+</file>
+
 <file path=ppt/notesSlides/notesSlide2.xml><?xml version="1.0" encoding="utf-8"?>
 <p:notes xmlns:a="http://schemas.openxmlformats.org/drawingml/2006/main" xmlns:r="http://schemas.openxmlformats.org/officeDocument/2006/relationships" xmlns:p="http://schemas.openxmlformats.org/presentationml/2006/main">
   <p:cSld>
@@ -1592,25 +1676,8 @@
                 <a:effectLst/>
                 <a:latin typeface="Slack-Lato"/>
               </a:rPr>
-              <a:t>May underrepresent availability in certain </a:t>
-            </a:r>
-            <a:r>
-              <a:rPr lang="en-GB" b="0" i="0" dirty="0" err="1">
-                <a:solidFill>
-                  <a:srgbClr val="1D1C1D"/>
-                </a:solidFill>
-                <a:effectLst/>
-                <a:latin typeface="Slack-Lato"/>
-              </a:rPr>
-              <a:t>neighborhoods</a:t>
-            </a:r>
-            <a:endParaRPr lang="en-GB" b="0" i="0" dirty="0">
-              <a:solidFill>
-                <a:srgbClr val="1D1C1D"/>
-              </a:solidFill>
-              <a:effectLst/>
-              <a:latin typeface="Slack-Lato"/>
-            </a:endParaRPr>
+              <a:t>May underrepresent availability in certain neighbourhoods</a:t>
+            </a:r>
           </a:p>
           <a:p>
             <a:pPr algn="l">
@@ -2310,7 +2377,7 @@
           <a:p>
             <a:fld id="{06F0EE7B-22F6-468D-A434-EC27BE18C34A}" type="slidenum">
               <a:rPr lang="en-GB" smtClean="0"/>
-              <a:t>10</a:t>
+              <a:t>9</a:t>
             </a:fld>
             <a:endParaRPr lang="en-GB"/>
           </a:p>
@@ -2319,7 +2386,7 @@
     </p:spTree>
     <p:extLst>
       <p:ext uri="{BB962C8B-B14F-4D97-AF65-F5344CB8AC3E}">
-        <p14:creationId xmlns:p14="http://schemas.microsoft.com/office/powerpoint/2010/main" val="3626193129"/>
+        <p14:creationId xmlns:p14="http://schemas.microsoft.com/office/powerpoint/2010/main" val="3634159660"/>
       </p:ext>
     </p:extLst>
   </p:cSld>
@@ -8154,7 +8221,7 @@
                 <a:solidFill>
                   <a:schemeClr val="bg1"/>
                 </a:solidFill>
-                <a:hlinkClick r:id="rId9">
+                <a:hlinkClick r:id="rId10">
                   <a:extLst>
                     <a:ext uri="{A12FA001-AC4F-418D-AE19-62706E023703}">
                       <ahyp:hlinkClr xmlns:ahyp="http://schemas.microsoft.com/office/drawing/2018/hyperlinkcolor" val="tx"/>
@@ -8169,7 +8236,7 @@
                 <a:solidFill>
                   <a:schemeClr val="bg1"/>
                 </a:solidFill>
-                <a:hlinkClick r:id="rId9">
+                <a:hlinkClick r:id="rId10">
                   <a:extLst>
                     <a:ext uri="{A12FA001-AC4F-418D-AE19-62706E023703}">
                       <ahyp:hlinkClr xmlns:ahyp="http://schemas.microsoft.com/office/drawing/2018/hyperlinkcolor" val="tx"/>
@@ -8184,7 +8251,7 @@
                 <a:solidFill>
                   <a:schemeClr val="bg1"/>
                 </a:solidFill>
-                <a:hlinkClick r:id="rId9">
+                <a:hlinkClick r:id="rId10">
                   <a:extLst>
                     <a:ext uri="{A12FA001-AC4F-418D-AE19-62706E023703}">
                       <ahyp:hlinkClr xmlns:ahyp="http://schemas.microsoft.com/office/drawing/2018/hyperlinkcolor" val="tx"/>
@@ -8213,7 +8280,7 @@
           <p:nvPr/>
         </p:nvPicPr>
         <p:blipFill>
-          <a:blip r:embed="rId10">
+          <a:blip r:embed="rId11">
             <a:extLst>
               <a:ext uri="{28A0092B-C50C-407E-A947-70E740481C1C}">
                 <a14:useLocalDpi xmlns:a14="http://schemas.microsoft.com/office/drawing/2010/main" val="0"/>
@@ -8284,7 +8351,7 @@
                 <a:solidFill>
                   <a:srgbClr val="0563C1"/>
                 </a:solidFill>
-                <a:hlinkClick r:id="rId11">
+                <a:hlinkClick r:id="rId7">
                   <a:extLst>
                     <a:ext uri="{A12FA001-AC4F-418D-AE19-62706E023703}">
                       <ahyp:hlinkClr xmlns:ahyp="http://schemas.microsoft.com/office/drawing/2018/hyperlinkcolor" val="tx"/>
@@ -8299,7 +8366,7 @@
                 <a:solidFill>
                   <a:schemeClr val="bg1"/>
                 </a:solidFill>
-                <a:hlinkClick r:id="rId11">
+                <a:hlinkClick r:id="rId7">
                   <a:extLst>
                     <a:ext uri="{A12FA001-AC4F-418D-AE19-62706E023703}">
                       <ahyp:hlinkClr xmlns:ahyp="http://schemas.microsoft.com/office/drawing/2018/hyperlinkcolor" val="tx"/>
@@ -8314,7 +8381,7 @@
                 <a:solidFill>
                   <a:schemeClr val="bg1"/>
                 </a:solidFill>
-                <a:hlinkClick r:id="rId11">
+                <a:hlinkClick r:id="rId7">
                   <a:extLst>
                     <a:ext uri="{A12FA001-AC4F-418D-AE19-62706E023703}">
                       <ahyp:hlinkClr xmlns:ahyp="http://schemas.microsoft.com/office/drawing/2018/hyperlinkcolor" val="tx"/>
@@ -8329,7 +8396,7 @@
                 <a:solidFill>
                   <a:schemeClr val="bg1"/>
                 </a:solidFill>
-                <a:hlinkClick r:id="rId11">
+                <a:hlinkClick r:id="rId7">
                   <a:extLst>
                     <a:ext uri="{A12FA001-AC4F-418D-AE19-62706E023703}">
                       <ahyp:hlinkClr xmlns:ahyp="http://schemas.microsoft.com/office/drawing/2018/hyperlinkcolor" val="tx"/>
@@ -9138,7 +9205,7 @@
           <p:nvPr/>
         </p:nvPicPr>
         <p:blipFill>
-          <a:blip r:embed="rId2">
+          <a:blip r:embed="rId3">
             <a:alphaModFix amt="50000"/>
             <a:extLst>
               <a:ext uri="{28A0092B-C50C-407E-A947-70E740481C1C}">
@@ -9226,10 +9293,15 @@
             <p:ph idx="1"/>
           </p:nvPr>
         </p:nvSpPr>
-        <p:spPr/>
+        <p:spPr>
+          <a:xfrm>
+            <a:off x="838200" y="1825625"/>
+            <a:ext cx="10515600" cy="5456918"/>
+          </a:xfrm>
+        </p:spPr>
         <p:txBody>
           <a:bodyPr>
-            <a:normAutofit lnSpcReduction="10000"/>
+            <a:normAutofit fontScale="55000" lnSpcReduction="20000"/>
           </a:bodyPr>
           <a:lstStyle/>
           <a:p>
@@ -9237,7 +9309,7 @@
               <a:buNone/>
             </a:pPr>
             <a:r>
-              <a:rPr lang="en-GB" sz="1600" dirty="0">
+              <a:rPr lang="en-GB" sz="2500" dirty="0">
                 <a:solidFill>
                   <a:schemeClr val="bg1"/>
                 </a:solidFill>
@@ -9245,43 +9317,7 @@
               <a:t>Arora, P. (2020, July 12). Minorities Around the World. Voices of Youth. </a:t>
             </a:r>
             <a:r>
-              <a:rPr lang="en-GB" sz="1600" dirty="0">
-                <a:solidFill>
-                  <a:schemeClr val="bg1"/>
-                </a:solidFill>
-                <a:hlinkClick r:id="rId3">
-                  <a:extLst>
-                    <a:ext uri="{A12FA001-AC4F-418D-AE19-62706E023703}">
-                      <ahyp:hlinkClr xmlns:ahyp="http://schemas.microsoft.com/office/drawing/2018/hyperlinkcolor" val="tx"/>
-                    </a:ext>
-                  </a:extLst>
-                </a:hlinkClick>
-              </a:rPr>
-              <a:t>https://www.voicesofyouth.org/blog/minorities-around-world</a:t>
-            </a:r>
-            <a:r>
-              <a:rPr lang="en-GB" sz="1600" dirty="0">
-                <a:solidFill>
-                  <a:schemeClr val="bg1"/>
-                </a:solidFill>
-              </a:rPr>
-              <a:t> </a:t>
-            </a:r>
-          </a:p>
-          <a:p>
-            <a:pPr marL="0" indent="0">
-              <a:buNone/>
-            </a:pPr>
-            <a:r>
-              <a:rPr lang="en-GB" sz="1600" dirty="0">
-                <a:solidFill>
-                  <a:schemeClr val="bg1"/>
-                </a:solidFill>
-              </a:rPr>
-              <a:t>Dante Lee International. (2019). 51% of American Students Are Considered Poor -- and Most Are From These 10 States! [Online image]. In Low Income Housing Authority. </a:t>
-            </a:r>
-            <a:r>
-              <a:rPr lang="en-GB" sz="1600" dirty="0">
+              <a:rPr lang="en-GB" sz="2500" dirty="0">
                 <a:solidFill>
                   <a:schemeClr val="bg1"/>
                 </a:solidFill>
@@ -9293,28 +9329,44 @@
                   </a:extLst>
                 </a:hlinkClick>
               </a:rPr>
-              <a:t>https://www.lowincome.org/2015/03/51-percent-american-students-poor-low-income.html</a:t>
-            </a:r>
-            <a:endParaRPr lang="en-GB" sz="1600" dirty="0">
-              <a:solidFill>
-                <a:schemeClr val="bg1"/>
-              </a:solidFill>
-            </a:endParaRPr>
-          </a:p>
-          <a:p>
-            <a:pPr marL="0" indent="0" algn="l">
+              <a:t>https://www.voicesofyouth.org/blog/minorities-around-world</a:t>
+            </a:r>
+            <a:r>
+              <a:rPr lang="en-GB" sz="2500" dirty="0">
+                <a:solidFill>
+                  <a:schemeClr val="bg1"/>
+                </a:solidFill>
+              </a:rPr>
+              <a:t> </a:t>
+            </a:r>
+          </a:p>
+          <a:p>
+            <a:pPr marL="0" indent="0">
               <a:buNone/>
             </a:pPr>
             <a:r>
-              <a:rPr lang="en-GB" sz="1600" dirty="0">
+              <a:rPr lang="en-GB" sz="2500" dirty="0">
                 <a:solidFill>
                   <a:schemeClr val="bg1"/>
                 </a:solidFill>
               </a:rPr>
-              <a:t>Detrick, B. (2013, June 26). Williamsburg’s Movie Houses: Where Popcorn Feels Passé. The New York Times. </a:t>
-            </a:r>
-            <a:r>
-              <a:rPr lang="en-GB" sz="1600" dirty="0">
+              <a:t>Child Hunger in America. (n.d.). Save the Children. https://www.savethechildren.org/us/charity-stories/child-hunger-in-america</a:t>
+            </a:r>
+          </a:p>
+          <a:p>
+            <a:pPr marL="0" indent="0">
+              <a:buNone/>
+            </a:pPr>
+            <a:r>
+              <a:rPr lang="en-GB" sz="2500" dirty="0">
+                <a:solidFill>
+                  <a:schemeClr val="bg1"/>
+                </a:solidFill>
+              </a:rPr>
+              <a:t>Dante Lee International. (2019). 51% of American Students Are Considered Poor -- and Most Are From These 10 States! [Online image]. In Low Income Housing Authority. </a:t>
+            </a:r>
+            <a:r>
+              <a:rPr lang="en-GB" sz="2500" dirty="0">
                 <a:solidFill>
                   <a:schemeClr val="bg1"/>
                 </a:solidFill>
@@ -9326,22 +9378,12 @@
                   </a:extLst>
                 </a:hlinkClick>
               </a:rPr>
-              <a:t>https://www.nytimes.com/2013/06/27/fashion/williamsburgs-movie-houses-where-popcorn-feels-passe.html</a:t>
-            </a:r>
-            <a:r>
-              <a:rPr lang="en-GB" sz="1600" dirty="0">
-                <a:solidFill>
-                  <a:schemeClr val="bg1"/>
-                </a:solidFill>
-              </a:rPr>
-              <a:t> </a:t>
-            </a:r>
-            <a:endParaRPr lang="en-GB" sz="1100" b="0" i="0" dirty="0">
+              <a:t>https://www.lowincome.org/2015/03/51-percent-american-students-poor-low-income.html</a:t>
+            </a:r>
+            <a:endParaRPr lang="en-GB" sz="2500" dirty="0">
               <a:solidFill>
                 <a:schemeClr val="bg1"/>
               </a:solidFill>
-              <a:effectLst/>
-              <a:latin typeface="Calibri" panose="020F0502020204030204" pitchFamily="34" charset="0"/>
             </a:endParaRPr>
           </a:p>
           <a:p>
@@ -9349,15 +9391,15 @@
               <a:buNone/>
             </a:pPr>
             <a:r>
-              <a:rPr lang="en-GB" sz="1600" dirty="0">
+              <a:rPr lang="en-GB" sz="2500" dirty="0">
                 <a:solidFill>
                   <a:schemeClr val="bg1"/>
                 </a:solidFill>
               </a:rPr>
-              <a:t>Gap between rich and poor, by state in the U.S. 2017 | Statistic. (2017). Statista; Statista. </a:t>
-            </a:r>
-            <a:r>
-              <a:rPr lang="en-GB" sz="1600" dirty="0">
+              <a:t>Detrick, B. (2013, June 26). Williamsburg’s Movie Houses: Where Popcorn Feels Passé. The New York Times. </a:t>
+            </a:r>
+            <a:r>
+              <a:rPr lang="en-GB" sz="2500" dirty="0">
                 <a:solidFill>
                   <a:schemeClr val="bg1"/>
                 </a:solidFill>
@@ -9369,10 +9411,10 @@
                   </a:extLst>
                 </a:hlinkClick>
               </a:rPr>
-              <a:t>https://www.statista.com/statistics/227249/greatest-gap-between-rich-and-poor-by-us-state/</a:t>
-            </a:r>
-            <a:r>
-              <a:rPr lang="en-GB" sz="1600" dirty="0">
+              <a:t>https://www.nytimes.com/2013/06/27/fashion/williamsburgs-movie-houses-where-popcorn-feels-passe.html</a:t>
+            </a:r>
+            <a:r>
+              <a:rPr lang="en-GB" sz="2500" dirty="0">
                 <a:solidFill>
                   <a:schemeClr val="bg1"/>
                 </a:solidFill>
@@ -9385,17 +9427,30 @@
               <a:buNone/>
             </a:pPr>
             <a:r>
-              <a:rPr lang="en-GB" sz="1600" dirty="0">
+              <a:rPr lang="en-GB" sz="2500" dirty="0">
                 <a:solidFill>
                   <a:schemeClr val="bg1"/>
                 </a:solidFill>
               </a:rPr>
-              <a:t>Interactive: The Unequal States of America. (n.d.). Economic Policy Institute. </a:t>
-            </a:r>
-            <a:r>
-              <a:rPr lang="en-GB" sz="1600" dirty="0">
-                <a:solidFill>
-                  <a:srgbClr val="0563C1"/>
+              <a:t>Diverse Group Serious Images – Browse 7,017 Stock Photos, Vectors, and Video. (n.d.). Adobe Stock. Retrieved August 14, 2023, from https://stock.adobe.com/search?k=diverse+group+serious</a:t>
+            </a:r>
+          </a:p>
+          <a:p>
+            <a:pPr marL="0" indent="0" algn="l">
+              <a:buNone/>
+            </a:pPr>
+            <a:r>
+              <a:rPr lang="en-GB" sz="2500" dirty="0">
+                <a:solidFill>
+                  <a:schemeClr val="bg1"/>
+                </a:solidFill>
+              </a:rPr>
+              <a:t>Gap between rich and poor, by state in the U.S. 2017 | Statistic. (2017). Statista; Statista. </a:t>
+            </a:r>
+            <a:r>
+              <a:rPr lang="en-GB" sz="2500" dirty="0">
+                <a:solidFill>
+                  <a:schemeClr val="bg1"/>
                 </a:solidFill>
                 <a:hlinkClick r:id="rId7">
                   <a:extLst>
@@ -9405,14 +9460,35 @@
                   </a:extLst>
                 </a:hlinkClick>
               </a:rPr>
-              <a:t>https://www.epi.org/multimedia/unequal-states-of-america/#/New%</a:t>
-            </a:r>
-            <a:r>
-              <a:rPr lang="en-GB" sz="1600" dirty="0">
+              <a:t>https://www.statista.com/statistics/227249/greatest-gap-between-rich-and-poor-by-us-state/</a:t>
+            </a:r>
+            <a:r>
+              <a:rPr lang="en-GB" sz="2500" dirty="0">
                 <a:solidFill>
                   <a:schemeClr val="bg1"/>
                 </a:solidFill>
-                <a:hlinkClick r:id="rId7">
+              </a:rPr>
+              <a:t> </a:t>
+            </a:r>
+          </a:p>
+          <a:p>
+            <a:pPr marL="0" indent="0" algn="l">
+              <a:buNone/>
+            </a:pPr>
+            <a:r>
+              <a:rPr lang="en-GB" sz="2500" dirty="0">
+                <a:solidFill>
+                  <a:schemeClr val="bg1"/>
+                </a:solidFill>
+              </a:rPr>
+              <a:t>Interactive: The Unequal States of America. (n.d.). Economic Policy Institute. </a:t>
+            </a:r>
+            <a:r>
+              <a:rPr lang="en-GB" sz="2500" dirty="0">
+                <a:solidFill>
+                  <a:schemeClr val="bg1"/>
+                </a:solidFill>
+                <a:hlinkClick r:id="rId8">
                   <a:extLst>
                     <a:ext uri="{A12FA001-AC4F-418D-AE19-62706E023703}">
                       <ahyp:hlinkClr xmlns:ahyp="http://schemas.microsoft.com/office/drawing/2018/hyperlinkcolor" val="tx"/>
@@ -9420,10 +9496,10 @@
                   </a:extLst>
                 </a:hlinkClick>
               </a:rPr>
-              <a:t>20York</a:t>
-            </a:r>
-            <a:r>
-              <a:rPr lang="en-GB" sz="1600" dirty="0">
+              <a:t>https://www.epi.org/multimedia/unequal-states-of-america/#/New%20York</a:t>
+            </a:r>
+            <a:r>
+              <a:rPr lang="en-GB" sz="2500" dirty="0">
                 <a:solidFill>
                   <a:schemeClr val="bg1"/>
                 </a:solidFill>
@@ -9432,20 +9508,27 @@
             </a:r>
           </a:p>
           <a:p>
-            <a:pPr algn="l"/>
-            <a:endParaRPr lang="en-GB" sz="1100" b="0" i="0" dirty="0">
-              <a:solidFill>
-                <a:schemeClr val="bg1"/>
-              </a:solidFill>
-              <a:effectLst/>
-              <a:latin typeface="Calibri" panose="020F0502020204030204" pitchFamily="34" charset="0"/>
-            </a:endParaRPr>
-          </a:p>
-          <a:p>
             <a:pPr marL="0" indent="0" algn="l">
               <a:buNone/>
             </a:pPr>
-            <a:endParaRPr lang="en-GB" sz="1600" dirty="0">
+            <a:r>
+              <a:rPr lang="en-GB" sz="2500" dirty="0">
+                <a:solidFill>
+                  <a:schemeClr val="bg1"/>
+                </a:solidFill>
+              </a:rPr>
+              <a:t>Introduction To The D3 JavaScript Library. (n.d.). Retrieved August 14, 2023, from </a:t>
+            </a:r>
+            <a:r>
+              <a:rPr lang="en-GB" sz="2500" dirty="0">
+                <a:solidFill>
+                  <a:schemeClr val="bg1"/>
+                </a:solidFill>
+                <a:hlinkClick r:id="rId9"/>
+              </a:rPr>
+              <a:t>https://vegibit.com/introduction-to-the-d3-javascript-library/</a:t>
+            </a:r>
+            <a:endParaRPr lang="en-GB" sz="2500" dirty="0">
               <a:solidFill>
                 <a:schemeClr val="bg1"/>
               </a:solidFill>
@@ -9456,12 +9539,134 @@
               <a:buNone/>
             </a:pPr>
             <a:r>
-              <a:rPr lang="en-GB" sz="1100" b="0" i="0" dirty="0">
+              <a:rPr lang="en-GB" sz="2500" dirty="0">
                 <a:solidFill>
                   <a:schemeClr val="bg1"/>
                 </a:solidFill>
-                <a:effectLst/>
-                <a:latin typeface="Calibri" panose="020F0502020204030204" pitchFamily="34" charset="0"/>
+              </a:rPr>
+              <a:t>Leaflet – JavaScript Library for Mobile Friendly Maps. (n.d.). </a:t>
+            </a:r>
+            <a:r>
+              <a:rPr lang="en-GB" sz="2500" dirty="0" err="1">
+                <a:solidFill>
+                  <a:schemeClr val="bg1"/>
+                </a:solidFill>
+              </a:rPr>
+              <a:t>JQuery</a:t>
+            </a:r>
+            <a:r>
+              <a:rPr lang="en-GB" sz="2500" dirty="0">
+                <a:solidFill>
+                  <a:schemeClr val="bg1"/>
+                </a:solidFill>
+              </a:rPr>
+              <a:t> Plugins. Retrieved August 14, 2023, from </a:t>
+            </a:r>
+            <a:r>
+              <a:rPr lang="en-GB" sz="2500" dirty="0">
+                <a:solidFill>
+                  <a:schemeClr val="bg1"/>
+                </a:solidFill>
+                <a:hlinkClick r:id="rId10"/>
+              </a:rPr>
+              <a:t>https://jquery-plugins.net/leaflet-javascript-library-for-mobile-friendly-maps</a:t>
+            </a:r>
+            <a:endParaRPr lang="en-GB" sz="2500" dirty="0">
+              <a:solidFill>
+                <a:schemeClr val="bg1"/>
+              </a:solidFill>
+            </a:endParaRPr>
+          </a:p>
+          <a:p>
+            <a:pPr marL="0" indent="0" algn="l">
+              <a:buNone/>
+            </a:pPr>
+            <a:r>
+              <a:rPr lang="en-GB" sz="2500" dirty="0">
+                <a:solidFill>
+                  <a:schemeClr val="bg1"/>
+                </a:solidFill>
+              </a:rPr>
+              <a:t>P, C. (n.d.). </a:t>
+            </a:r>
+            <a:r>
+              <a:rPr lang="en-GB" sz="2500" dirty="0" err="1">
+                <a:solidFill>
+                  <a:schemeClr val="bg1"/>
+                </a:solidFill>
+              </a:rPr>
+              <a:t>plotly</a:t>
+            </a:r>
+            <a:r>
+              <a:rPr lang="en-GB" sz="2500" dirty="0">
+                <a:solidFill>
+                  <a:schemeClr val="bg1"/>
+                </a:solidFill>
+              </a:rPr>
+              <a:t>: An open-source, interactive data visualization library for Python. </a:t>
+            </a:r>
+            <a:r>
+              <a:rPr lang="en-GB" sz="2500" dirty="0" err="1">
+                <a:solidFill>
+                  <a:schemeClr val="bg1"/>
+                </a:solidFill>
+              </a:rPr>
+              <a:t>PyPI</a:t>
+            </a:r>
+            <a:r>
+              <a:rPr lang="en-GB" sz="2500" dirty="0">
+                <a:solidFill>
+                  <a:schemeClr val="bg1"/>
+                </a:solidFill>
+              </a:rPr>
+              <a:t>. https://pypi.org/project/plotly/</a:t>
+            </a:r>
+          </a:p>
+          <a:p>
+            <a:pPr marL="0" indent="0" algn="l">
+              <a:buNone/>
+            </a:pPr>
+            <a:r>
+              <a:rPr lang="en-GB" sz="2500" dirty="0">
+                <a:solidFill>
+                  <a:schemeClr val="bg1"/>
+                </a:solidFill>
+              </a:rPr>
+              <a:t>The reality of quitting your job to become a full-time carer. (n.d.). Www.welcometothejungle.com. https://www.welcometothejungle.com/en/articles/the-reality-of-quitting-your-job-to-become-a-full-time-carer</a:t>
+            </a:r>
+          </a:p>
+          <a:p>
+            <a:pPr marL="0" indent="0" algn="l">
+              <a:buNone/>
+            </a:pPr>
+            <a:r>
+              <a:rPr lang="en-GB" sz="2500" dirty="0">
+                <a:solidFill>
+                  <a:schemeClr val="bg1"/>
+                </a:solidFill>
+              </a:rPr>
+              <a:t>‌What is JavaScript. (2019). What is JavaScript? Computerhope.com. https://www.computerhope.com/jargon/j/javascript.htm</a:t>
+            </a:r>
+          </a:p>
+          <a:p>
+            <a:pPr marL="0" indent="0" algn="l">
+              <a:buNone/>
+            </a:pPr>
+            <a:endParaRPr lang="en-GB" sz="1500" dirty="0">
+              <a:solidFill>
+                <a:schemeClr val="bg1"/>
+              </a:solidFill>
+            </a:endParaRPr>
+          </a:p>
+          <a:p>
+            <a:pPr marL="0" indent="0" algn="l">
+              <a:buNone/>
+            </a:pPr>
+            <a:r>
+              <a:rPr lang="en-GB" sz="1500" dirty="0">
+                <a:solidFill>
+                  <a:schemeClr val="bg1"/>
+                </a:solidFill>
               </a:rPr>
               <a:t>‌</a:t>
             </a:r>

</xml_diff>

<commit_message>
Powerpoint slide deck + Word script
</commit_message>
<xml_diff>
--- a/Project-3 Slide Deck.pptx
+++ b/Project-3 Slide Deck.pptx
@@ -244,7 +244,7 @@
           <a:p>
             <a:fld id="{81C3189F-2654-4FF5-876C-10CBDB4B57BA}" type="datetimeFigureOut">
               <a:rPr lang="en-GB" smtClean="0"/>
-              <a:t>14/08/2023</a:t>
+              <a:t>15/08/2023</a:t>
             </a:fld>
             <a:endParaRPr lang="en-GB"/>
           </a:p>
@@ -1009,29 +1009,18 @@
           <a:lstStyle/>
           <a:p>
             <a:r>
+              <a:rPr lang="en-GB" b="0" i="0" dirty="0">
+                <a:solidFill>
+                  <a:srgbClr val="FFFFFF"/>
+                </a:solidFill>
+                <a:effectLst/>
+                <a:latin typeface="Segoe UI Historic" panose="020B0502040204020203" pitchFamily="34" charset="0"/>
+              </a:rPr>
+              <a:t>Our visuals are displayed on an index webpage and update at the same time, the webpage was built and formatted using HTML/CSS. Although our HTML code references each script file used to generated the visuals, they are individually housed by programming languages inside a static folder for organisation purposes. </a:t>
+            </a:r>
+            <a:br>
               <a:rPr lang="en-GB" dirty="0"/>
-              <a:t>We created three visuals to help show the distribution of wealth in New York, these visuals are displayed on a webpage which was built using HTML/CSS. </a:t>
-            </a:r>
-          </a:p>
-          <a:p>
-            <a:endParaRPr lang="en-GB" dirty="0"/>
-          </a:p>
-          <a:p>
-            <a:r>
-              <a:rPr lang="en-GB" dirty="0"/>
-              <a:t>Our data sources consisted of a GEOJSON and 2 CSV’s.</a:t>
-            </a:r>
-          </a:p>
-          <a:p>
-            <a:endParaRPr lang="en-GB" dirty="0"/>
-          </a:p>
-          <a:p>
-            <a:r>
-              <a:rPr lang="en-GB" dirty="0"/>
-              <a:t>All visualisations needed to be updated at the same time so the user could interact with them. Therefore, we created an index.html file which linked all our code scripts together. Each of the scripts that generate the visualisations are organised by programming languages inside a static folder.</a:t>
-            </a:r>
-          </a:p>
-          <a:p>
+            </a:br>
             <a:endParaRPr lang="en-GB" dirty="0"/>
           </a:p>
         </p:txBody>
@@ -1120,23 +1109,14 @@
               <a:buNone/>
             </a:pPr>
             <a:r>
-              <a:rPr lang="en-GB" dirty="0"/>
+              <a:rPr lang="en-GB" b="0" i="0" dirty="0">
+                <a:solidFill>
+                  <a:srgbClr val="FFFFFF"/>
+                </a:solidFill>
+                <a:effectLst/>
+                <a:latin typeface="Segoe UI Historic" panose="020B0502040204020203" pitchFamily="34" charset="0"/>
+              </a:rPr>
               <a:t>The scripts to bring our visualisations to life were coded using JavaScript with the assistance of some libraries and plugins. </a:t>
-            </a:r>
-          </a:p>
-          <a:p>
-            <a:pPr marL="0" indent="0">
-              <a:buNone/>
-            </a:pPr>
-            <a:endParaRPr lang="en-GB" dirty="0"/>
-          </a:p>
-          <a:p>
-            <a:pPr marL="0" indent="0">
-              <a:buNone/>
-            </a:pPr>
-            <a:r>
-              <a:rPr lang="en-GB" dirty="0"/>
-              <a:t>-   D3 was very powerful as it allowed us to connect our cleaned data sources. </a:t>
             </a:r>
           </a:p>
           <a:p>
@@ -1145,8 +1125,34 @@
               <a:buChar char="-"/>
             </a:pPr>
             <a:r>
-              <a:rPr lang="en-GB" dirty="0"/>
-              <a:t>Leaflet allowed us to create a map object with layers.</a:t>
+              <a:rPr lang="en-GB" b="0" i="0" dirty="0">
+                <a:solidFill>
+                  <a:srgbClr val="FFFFFF"/>
+                </a:solidFill>
+                <a:effectLst/>
+                <a:latin typeface="Segoe UI Historic" panose="020B0502040204020203" pitchFamily="34" charset="0"/>
+              </a:rPr>
+              <a:t>  D3 allowed us to connect our cleaned data sources including 2 CSV’s and a </a:t>
+            </a:r>
+            <a:r>
+              <a:rPr lang="en-GB" b="0" i="0" dirty="0" err="1">
+                <a:solidFill>
+                  <a:srgbClr val="FFFFFF"/>
+                </a:solidFill>
+                <a:effectLst/>
+                <a:latin typeface="Segoe UI Historic" panose="020B0502040204020203" pitchFamily="34" charset="0"/>
+              </a:rPr>
+              <a:t>geoJSON</a:t>
+            </a:r>
+            <a:r>
+              <a:rPr lang="en-GB" b="0" i="0" dirty="0">
+                <a:solidFill>
+                  <a:srgbClr val="FFFFFF"/>
+                </a:solidFill>
+                <a:effectLst/>
+                <a:latin typeface="Segoe UI Historic" panose="020B0502040204020203" pitchFamily="34" charset="0"/>
+              </a:rPr>
+              <a:t> file. </a:t>
             </a:r>
           </a:p>
           <a:p>
@@ -1155,12 +1161,14 @@
               <a:buChar char="-"/>
             </a:pPr>
             <a:r>
-              <a:rPr lang="en-GB" dirty="0" err="1"/>
-              <a:t>Plotly</a:t>
-            </a:r>
-            <a:r>
-              <a:rPr lang="en-GB" dirty="0"/>
-              <a:t> allowed us to create a user interactive scatter plot and heat map.</a:t>
+              <a:rPr lang="en-GB" b="0" i="0" dirty="0">
+                <a:solidFill>
+                  <a:srgbClr val="FFFFFF"/>
+                </a:solidFill>
+                <a:effectLst/>
+                <a:latin typeface="Segoe UI Historic" panose="020B0502040204020203" pitchFamily="34" charset="0"/>
+              </a:rPr>
+              <a:t>  Leaflet was used to create a map object with layers. </a:t>
             </a:r>
           </a:p>
           <a:p>
@@ -1169,31 +1177,128 @@
               <a:buChar char="-"/>
             </a:pPr>
             <a:r>
-              <a:rPr lang="en-GB" dirty="0"/>
-              <a:t>We also used a Leaflet plugin to incorporate a reset button on our first visualisation. </a:t>
-            </a:r>
+              <a:rPr lang="en-GB" b="0" i="0" dirty="0">
+                <a:solidFill>
+                  <a:srgbClr val="FFFFFF"/>
+                </a:solidFill>
+                <a:effectLst/>
+                <a:latin typeface="Segoe UI Historic" panose="020B0502040204020203" pitchFamily="34" charset="0"/>
+              </a:rPr>
+              <a:t>  </a:t>
+            </a:r>
+            <a:r>
+              <a:rPr lang="en-GB" b="0" i="0" dirty="0" err="1">
+                <a:solidFill>
+                  <a:srgbClr val="FFFFFF"/>
+                </a:solidFill>
+                <a:effectLst/>
+                <a:latin typeface="Segoe UI Historic" panose="020B0502040204020203" pitchFamily="34" charset="0"/>
+              </a:rPr>
+              <a:t>Plotly</a:t>
+            </a:r>
+            <a:r>
+              <a:rPr lang="en-GB" b="0" i="0" dirty="0">
+                <a:solidFill>
+                  <a:srgbClr val="FFFFFF"/>
+                </a:solidFill>
+                <a:effectLst/>
+                <a:latin typeface="Segoe UI Historic" panose="020B0502040204020203" pitchFamily="34" charset="0"/>
+              </a:rPr>
+              <a:t> allowed us to create a user interactive scatter plot and heat map. </a:t>
+            </a:r>
+          </a:p>
+          <a:p>
+            <a:pPr marL="171450" indent="-171450">
+              <a:buFontTx/>
+              <a:buChar char="-"/>
+            </a:pPr>
+            <a:r>
+              <a:rPr lang="en-GB" b="0" i="0" dirty="0">
+                <a:solidFill>
+                  <a:srgbClr val="FFFFFF"/>
+                </a:solidFill>
+                <a:effectLst/>
+                <a:latin typeface="Segoe UI Historic" panose="020B0502040204020203" pitchFamily="34" charset="0"/>
+              </a:rPr>
+              <a:t>  and a Leaflet plugin was adopted to incorporate a reset button on our first visualisation.</a:t>
+            </a:r>
+          </a:p>
+          <a:p>
+            <a:pPr marL="171450" indent="-171450">
+              <a:buFontTx/>
+              <a:buChar char="-"/>
+            </a:pPr>
+            <a:endParaRPr lang="en-GB" b="0" i="0" dirty="0">
+              <a:solidFill>
+                <a:srgbClr val="FFFFFF"/>
+              </a:solidFill>
+              <a:effectLst/>
+              <a:latin typeface="Segoe UI Historic" panose="020B0502040204020203" pitchFamily="34" charset="0"/>
+            </a:endParaRPr>
           </a:p>
           <a:p>
             <a:pPr marL="0" indent="0">
               <a:buFontTx/>
               <a:buNone/>
             </a:pPr>
-            <a:endParaRPr lang="en-GB" dirty="0"/>
-          </a:p>
-          <a:p>
-            <a:pPr marL="0" indent="0">
+            <a:r>
+              <a:rPr lang="en-GB" b="0" i="0" dirty="0">
+                <a:solidFill>
+                  <a:srgbClr val="FFFFFF"/>
+                </a:solidFill>
+                <a:effectLst/>
+                <a:latin typeface="Segoe UI Historic" panose="020B0502040204020203" pitchFamily="34" charset="0"/>
+              </a:rPr>
+              <a:t>Some coding techniques included: </a:t>
+            </a:r>
+          </a:p>
+          <a:p>
+            <a:pPr marL="171450" indent="-171450">
               <a:buFontTx/>
-              <a:buNone/>
+              <a:buChar char="-"/>
             </a:pPr>
             <a:r>
-              <a:rPr lang="en-GB" dirty="0"/>
-              <a:t>Some coding techniques included: using functions to optimise our code, using for loops with conditionals to allow dynamic visualisations, and mapping was useful when obtaining the values to plot from a CSV.  </a:t>
-            </a:r>
-          </a:p>
-          <a:p>
-            <a:pPr marL="0" indent="0">
-              <a:buNone/>
+              <a:rPr lang="en-GB" b="0" i="0" dirty="0">
+                <a:solidFill>
+                  <a:srgbClr val="FFFFFF"/>
+                </a:solidFill>
+                <a:effectLst/>
+                <a:latin typeface="Segoe UI Historic" panose="020B0502040204020203" pitchFamily="34" charset="0"/>
+              </a:rPr>
+              <a:t>Using functions to optimise our code</a:t>
+            </a:r>
+          </a:p>
+          <a:p>
+            <a:pPr marL="171450" indent="-171450">
+              <a:buFontTx/>
+              <a:buChar char="-"/>
             </a:pPr>
+            <a:r>
+              <a:rPr lang="en-GB" b="0" i="0" dirty="0">
+                <a:solidFill>
+                  <a:srgbClr val="FFFFFF"/>
+                </a:solidFill>
+                <a:effectLst/>
+                <a:latin typeface="Segoe UI Historic" panose="020B0502040204020203" pitchFamily="34" charset="0"/>
+              </a:rPr>
+              <a:t>For loops with conditionals enabled our dynamic visualisations,</a:t>
+            </a:r>
+          </a:p>
+          <a:p>
+            <a:pPr marL="171450" indent="-171450">
+              <a:buFontTx/>
+              <a:buChar char="-"/>
+            </a:pPr>
+            <a:r>
+              <a:rPr lang="en-GB" b="0" i="0" dirty="0">
+                <a:solidFill>
+                  <a:srgbClr val="FFFFFF"/>
+                </a:solidFill>
+                <a:effectLst/>
+                <a:latin typeface="Segoe UI Historic" panose="020B0502040204020203" pitchFamily="34" charset="0"/>
+              </a:rPr>
+              <a:t>and mapping was useful when obtaining values to plot from our CSV’s.</a:t>
+            </a:r>
             <a:endParaRPr lang="en-GB" dirty="0"/>
           </a:p>
           <a:p>
@@ -1284,60 +1389,114 @@
           <a:bodyPr/>
           <a:lstStyle/>
           <a:p>
-            <a:pPr marL="171450" indent="-171450">
+            <a:pPr marL="0" indent="0">
               <a:buFontTx/>
-              <a:buChar char="-"/>
+              <a:buNone/>
             </a:pPr>
             <a:r>
+              <a:rPr lang="en-GB" b="0" i="0" dirty="0">
+                <a:effectLst/>
+                <a:latin typeface="Arial" panose="020B0604020202020204" pitchFamily="34" charset="0"/>
+              </a:rPr>
+              <a:t>- We used the US Government's Open Data web site to find useful reliable datasets that we could analysed.</a:t>
+            </a:r>
+            <a:br>
               <a:rPr lang="en-GB" dirty="0"/>
-              <a:t>The two CSV files needed to be cleaned before they could be used.</a:t>
-            </a:r>
-          </a:p>
-          <a:p>
-            <a:pPr marL="171450" indent="-171450">
-              <a:buFontTx/>
-              <a:buChar char="-"/>
-            </a:pPr>
-            <a:r>
+            </a:br>
+            <a:r>
+              <a:rPr lang="en-GB" b="0" i="0" dirty="0">
+                <a:effectLst/>
+                <a:latin typeface="Arial" panose="020B0604020202020204" pitchFamily="34" charset="0"/>
+              </a:rPr>
+              <a:t>- We got a plethora of data sets.</a:t>
+            </a:r>
+            <a:br>
               <a:rPr lang="en-GB" dirty="0"/>
-              <a:t>We created a table with columns that would support the content of the CSV’s. </a:t>
-            </a:r>
-          </a:p>
-          <a:p>
-            <a:pPr marL="171450" indent="-171450">
-              <a:buFontTx/>
-              <a:buChar char="-"/>
-            </a:pPr>
-            <a:r>
+            </a:br>
+            <a:r>
+              <a:rPr lang="en-GB" b="0" i="0" dirty="0">
+                <a:effectLst/>
+                <a:latin typeface="Arial" panose="020B0604020202020204" pitchFamily="34" charset="0"/>
+              </a:rPr>
+              <a:t>- And used SQL to clean and improve the quality of these data,</a:t>
+            </a:r>
+            <a:br>
               <a:rPr lang="en-GB" dirty="0"/>
-              <a:t>The CSV’s were then imported the tables which had been created. </a:t>
-            </a:r>
-          </a:p>
-          <a:p>
-            <a:pPr marL="171450" indent="-171450">
-              <a:buFontTx/>
-              <a:buChar char="-"/>
-            </a:pPr>
-            <a:r>
+            </a:br>
+            <a:r>
+              <a:rPr lang="en-GB" b="0" i="0" dirty="0">
+                <a:effectLst/>
+                <a:latin typeface="Arial" panose="020B0604020202020204" pitchFamily="34" charset="0"/>
+              </a:rPr>
+              <a:t>- We found two data sets that could serve for the purpose of our project.</a:t>
+            </a:r>
+            <a:br>
               <a:rPr lang="en-GB" dirty="0"/>
-              <a:t>Redundant columns were removed. </a:t>
-            </a:r>
-          </a:p>
-          <a:p>
-            <a:pPr marL="171450" indent="-171450">
-              <a:buFontTx/>
-              <a:buChar char="-"/>
-            </a:pPr>
-            <a:r>
+            </a:br>
+            <a:r>
+              <a:rPr lang="en-GB" b="0" i="0" dirty="0">
+                <a:effectLst/>
+                <a:latin typeface="Arial" panose="020B0604020202020204" pitchFamily="34" charset="0"/>
+              </a:rPr>
+              <a:t>- However, these raw data in the form of CSV files needed to be processed and cleaned before they could be used.</a:t>
+            </a:r>
+            <a:br>
               <a:rPr lang="en-GB" dirty="0"/>
-              <a:t>Some rows had no data in and therefore they were removed as they didn’t offer additional insight. </a:t>
-            </a:r>
-          </a:p>
-          <a:p>
-            <a:pPr marL="171450" indent="-171450">
-              <a:buFontTx/>
-              <a:buChar char="-"/>
-            </a:pPr>
+            </a:br>
+            <a:r>
+              <a:rPr lang="en-GB" b="0" i="0" dirty="0">
+                <a:effectLst/>
+                <a:latin typeface="Arial" panose="020B0604020202020204" pitchFamily="34" charset="0"/>
+              </a:rPr>
+              <a:t>- We created tables with columns that would support the content of these files.</a:t>
+            </a:r>
+            <a:br>
+              <a:rPr lang="en-GB" dirty="0"/>
+            </a:br>
+            <a:r>
+              <a:rPr lang="en-GB" b="0" i="0" dirty="0">
+                <a:effectLst/>
+                <a:latin typeface="Arial" panose="020B0604020202020204" pitchFamily="34" charset="0"/>
+              </a:rPr>
+              <a:t>- The CSVs were then imported to those tables.</a:t>
+            </a:r>
+            <a:br>
+              <a:rPr lang="en-GB" dirty="0"/>
+            </a:br>
+            <a:r>
+              <a:rPr lang="en-GB" b="0" i="0" dirty="0">
+                <a:effectLst/>
+                <a:latin typeface="Arial" panose="020B0604020202020204" pitchFamily="34" charset="0"/>
+              </a:rPr>
+              <a:t>- Redundant columns were then removed.</a:t>
+            </a:r>
+            <a:br>
+              <a:rPr lang="en-GB" dirty="0"/>
+            </a:br>
+            <a:r>
+              <a:rPr lang="en-GB" b="0" i="0" dirty="0">
+                <a:effectLst/>
+                <a:latin typeface="Arial" panose="020B0604020202020204" pitchFamily="34" charset="0"/>
+              </a:rPr>
+              <a:t>- And rows that had no data in were also removed as they didn’t offer additional insight but noise.</a:t>
+            </a:r>
+            <a:br>
+              <a:rPr lang="en-GB" dirty="0"/>
+            </a:br>
+            <a:r>
+              <a:rPr lang="en-GB" b="0" i="0" dirty="0">
+                <a:effectLst/>
+                <a:latin typeface="Arial" panose="020B0604020202020204" pitchFamily="34" charset="0"/>
+              </a:rPr>
+              <a:t>- Now over to </a:t>
+            </a:r>
+            <a:r>
+              <a:rPr lang="en-GB" b="0" i="0" dirty="0" err="1">
+                <a:effectLst/>
+                <a:latin typeface="Arial" panose="020B0604020202020204" pitchFamily="34" charset="0"/>
+              </a:rPr>
+              <a:t>Chenita</a:t>
+            </a:r>
             <a:endParaRPr lang="en-GB" dirty="0"/>
           </a:p>
         </p:txBody>
@@ -1423,29 +1582,63 @@
           <a:lstStyle/>
           <a:p>
             <a:r>
+              <a:rPr lang="en-GB" b="0" i="0" dirty="0">
+                <a:effectLst/>
+                <a:latin typeface="Arial" panose="020B0604020202020204" pitchFamily="34" charset="0"/>
+              </a:rPr>
+              <a:t>We created a flask application which allows a single point of access for external users to view each of the data sources used for this project.</a:t>
+            </a:r>
+            <a:br>
               <a:rPr lang="en-GB" dirty="0"/>
-              <a:t>We created a flask application which allows an outsider to access all the </a:t>
-            </a:r>
-            <a:r>
-              <a:rPr lang="en-GB" dirty="0" err="1"/>
-              <a:t>datasources</a:t>
-            </a:r>
-            <a:r>
+            </a:br>
+            <a:endParaRPr lang="en-GB" dirty="0"/>
+          </a:p>
+          <a:p>
+            <a:r>
+              <a:rPr lang="en-GB" b="0" i="0" dirty="0">
+                <a:effectLst/>
+                <a:latin typeface="Arial" panose="020B0604020202020204" pitchFamily="34" charset="0"/>
+              </a:rPr>
+              <a:t>The available routes are listed on the main page, and the user can view them by copy and pasting the relevant path extension to the </a:t>
+            </a:r>
+            <a:r>
+              <a:rPr lang="en-GB" b="0" i="0" dirty="0" err="1">
+                <a:effectLst/>
+                <a:latin typeface="Arial" panose="020B0604020202020204" pitchFamily="34" charset="0"/>
+              </a:rPr>
+              <a:t>url</a:t>
+            </a:r>
+            <a:r>
+              <a:rPr lang="en-GB" b="0" i="0" dirty="0">
+                <a:effectLst/>
+                <a:latin typeface="Arial" panose="020B0604020202020204" pitchFamily="34" charset="0"/>
+              </a:rPr>
+              <a:t> field.</a:t>
+            </a:r>
+            <a:br>
               <a:rPr lang="en-GB" dirty="0"/>
-              <a:t> used for this project in one place. </a:t>
-            </a:r>
-          </a:p>
-          <a:p>
-            <a:r>
+            </a:br>
+            <a:r>
+              <a:rPr lang="en-GB" b="0" i="0" dirty="0">
+                <a:effectLst/>
+                <a:latin typeface="Arial" panose="020B0604020202020204" pitchFamily="34" charset="0"/>
+              </a:rPr>
+              <a:t>When a route is visited, that particular dataset populates within the current tab; and once the user is ready to view another file, they can simply select the back button and then copy and paste the dataset of their choice.</a:t>
+            </a:r>
+            <a:br>
               <a:rPr lang="en-GB" dirty="0"/>
-              <a:t>The available routes are shown to the user on the main page. </a:t>
-            </a:r>
-          </a:p>
-          <a:p>
-            <a:r>
-              <a:rPr lang="en-GB" dirty="0"/>
-              <a:t>When each route is visited, the dataset is available for the user to view.</a:t>
-            </a:r>
+            </a:br>
+            <a:endParaRPr lang="en-GB" dirty="0"/>
+          </a:p>
+          <a:p>
+            <a:r>
+              <a:rPr lang="en-GB" b="0" i="0" dirty="0">
+                <a:effectLst/>
+                <a:latin typeface="Arial" panose="020B0604020202020204" pitchFamily="34" charset="0"/>
+              </a:rPr>
+              <a:t>***Outro: Over to Uche... ***</a:t>
+            </a:r>
+            <a:endParaRPr lang="en-GB" dirty="0"/>
           </a:p>
         </p:txBody>
       </p:sp>
@@ -1532,746 +1725,84 @@
             <a:pPr algn="l"/>
             <a:r>
               <a:rPr lang="en-GB" b="0" i="0" dirty="0">
-                <a:solidFill>
-                  <a:srgbClr val="1D1C1D"/>
-                </a:solidFill>
                 <a:effectLst/>
-                <a:latin typeface="Slack-Lato"/>
-              </a:rPr>
-              <a:t>Review for PII:</a:t>
+                <a:latin typeface="Arial" panose="020B0604020202020204" pitchFamily="34" charset="0"/>
+              </a:rPr>
+              <a:t>The variability in community response affects the overall consistency of data which could result from lack resources in some communities, lack of coordination between communities or other factors that vary across the different jurisdictions.</a:t>
             </a:r>
             <a:br>
+              <a:rPr lang="en-GB" dirty="0"/>
+            </a:br>
+            <a:endParaRPr lang="en-GB" dirty="0"/>
+          </a:p>
+          <a:p>
+            <a:pPr algn="l"/>
+            <a:r>
               <a:rPr lang="en-GB" b="0" i="0" dirty="0">
-                <a:solidFill>
-                  <a:srgbClr val="1D1C1D"/>
-                </a:solidFill>
                 <a:effectLst/>
-                <a:latin typeface="Slack-Lato"/>
-              </a:rPr>
+                <a:latin typeface="Arial" panose="020B0604020202020204" pitchFamily="34" charset="0"/>
+              </a:rPr>
+              <a:t>Inconsistencies and inaccuracies of data source due to variations in reporting standards</a:t>
+            </a:r>
+            <a:br>
+              <a:rPr lang="en-GB" dirty="0"/>
             </a:br>
-            <a:endParaRPr lang="en-GB" b="0" i="0" dirty="0">
-              <a:solidFill>
-                <a:srgbClr val="1D1C1D"/>
-              </a:solidFill>
-              <a:effectLst/>
-              <a:latin typeface="Slack-Lato"/>
-            </a:endParaRPr>
-          </a:p>
-          <a:p>
-            <a:pPr algn="l">
-              <a:buFont typeface="Arial" panose="020B0604020202020204" pitchFamily="34" charset="0"/>
-              <a:buChar char="•"/>
-            </a:pPr>
+            <a:endParaRPr lang="en-GB" dirty="0"/>
+          </a:p>
+          <a:p>
+            <a:pPr algn="l"/>
             <a:r>
               <a:rPr lang="en-GB" b="0" i="0" dirty="0">
-                <a:solidFill>
-                  <a:srgbClr val="1D1C1D"/>
-                </a:solidFill>
                 <a:effectLst/>
-                <a:latin typeface="Slack-Lato"/>
-              </a:rPr>
-              <a:t>Data is at town level, does not contain obvious personal identifiers</a:t>
-            </a:r>
+                <a:latin typeface="Arial" panose="020B0604020202020204" pitchFamily="34" charset="0"/>
+              </a:rPr>
+              <a:t>The dataset available provides information for the fiscal year 2019 only, thereby limiting insights to that specific timeframe.</a:t>
+            </a:r>
+            <a:br>
+              <a:rPr lang="en-GB" dirty="0"/>
+            </a:br>
+            <a:endParaRPr lang="en-GB" dirty="0"/>
           </a:p>
           <a:p>
             <a:pPr algn="l"/>
             <a:r>
               <a:rPr lang="en-GB" b="0" i="0" dirty="0">
-                <a:solidFill>
-                  <a:srgbClr val="1D1C1D"/>
-                </a:solidFill>
                 <a:effectLst/>
-                <a:latin typeface="Slack-Lato"/>
-              </a:rPr>
-              <a:t>Consent for collection:</a:t>
+                <a:latin typeface="Arial" panose="020B0604020202020204" pitchFamily="34" charset="0"/>
+              </a:rPr>
+              <a:t>The dataset offers numerical data without extensive context, which </a:t>
+            </a:r>
+            <a:r>
+              <a:rPr lang="en-GB" b="0" i="0">
+                <a:effectLst/>
+                <a:latin typeface="Arial" panose="020B0604020202020204" pitchFamily="34" charset="0"/>
+              </a:rPr>
+              <a:t>may require</a:t>
+            </a:r>
+            <a:r>
+              <a:rPr lang="en-GB" b="0" i="0" dirty="0">
+                <a:effectLst/>
+                <a:latin typeface="Arial" panose="020B0604020202020204" pitchFamily="34" charset="0"/>
+              </a:rPr>
+              <a:t> </a:t>
+            </a:r>
+            <a:r>
+              <a:rPr lang="en-GB" b="0" i="0">
+                <a:effectLst/>
+                <a:latin typeface="Arial" panose="020B0604020202020204" pitchFamily="34" charset="0"/>
+              </a:rPr>
+              <a:t>additional </a:t>
+            </a:r>
+            <a:r>
+              <a:rPr lang="en-GB" b="0" i="0" dirty="0">
+                <a:effectLst/>
+                <a:latin typeface="Arial" panose="020B0604020202020204" pitchFamily="34" charset="0"/>
+              </a:rPr>
+              <a:t>information for comprehensive analysis.</a:t>
             </a:r>
             <a:br>
-              <a:rPr lang="en-GB" b="0" i="0" dirty="0">
-                <a:solidFill>
-                  <a:srgbClr val="1D1C1D"/>
-                </a:solidFill>
-                <a:effectLst/>
-                <a:latin typeface="Slack-Lato"/>
-              </a:rPr>
+              <a:rPr lang="en-GB" dirty="0"/>
             </a:br>
-            <a:endParaRPr lang="en-GB" b="0" i="0" dirty="0">
-              <a:solidFill>
-                <a:srgbClr val="1D1C1D"/>
-              </a:solidFill>
-              <a:effectLst/>
-              <a:latin typeface="Slack-Lato"/>
-            </a:endParaRPr>
-          </a:p>
-          <a:p>
-            <a:pPr algn="l">
-              <a:buFont typeface="Arial" panose="020B0604020202020204" pitchFamily="34" charset="0"/>
-              <a:buChar char="•"/>
-            </a:pPr>
-            <a:r>
-              <a:rPr lang="en-GB" b="0" i="0" dirty="0">
-                <a:solidFill>
-                  <a:srgbClr val="1D1C1D"/>
-                </a:solidFill>
-                <a:effectLst/>
-                <a:latin typeface="Slack-Lato"/>
-              </a:rPr>
-              <a:t>No evidence of consent from municipalities or housing providers</a:t>
-            </a:r>
-          </a:p>
-          <a:p>
-            <a:pPr algn="l">
-              <a:buFont typeface="Arial" panose="020B0604020202020204" pitchFamily="34" charset="0"/>
-              <a:buChar char="•"/>
-            </a:pPr>
-            <a:r>
-              <a:rPr lang="en-GB" b="0" i="0" dirty="0">
-                <a:solidFill>
-                  <a:srgbClr val="1D1C1D"/>
-                </a:solidFill>
-                <a:effectLst/>
-                <a:latin typeface="Slack-Lato"/>
-              </a:rPr>
-              <a:t>However, given that we have selected to source data from government websites - we trust that the</a:t>
-            </a:r>
-          </a:p>
-          <a:p>
-            <a:pPr algn="l"/>
-            <a:r>
-              <a:rPr lang="en-GB" b="0" i="0" dirty="0">
-                <a:solidFill>
-                  <a:srgbClr val="1D1C1D"/>
-                </a:solidFill>
-                <a:effectLst/>
-                <a:latin typeface="Slack-Lato"/>
-              </a:rPr>
-              <a:t>Representativeness:</a:t>
-            </a:r>
-            <a:br>
-              <a:rPr lang="en-GB" b="0" i="0" dirty="0">
-                <a:solidFill>
-                  <a:srgbClr val="1D1C1D"/>
-                </a:solidFill>
-                <a:effectLst/>
-                <a:latin typeface="Slack-Lato"/>
-              </a:rPr>
-            </a:br>
-            <a:endParaRPr lang="en-GB" b="0" i="0" dirty="0">
-              <a:solidFill>
-                <a:srgbClr val="1D1C1D"/>
-              </a:solidFill>
-              <a:effectLst/>
-              <a:latin typeface="Slack-Lato"/>
-            </a:endParaRPr>
-          </a:p>
-          <a:p>
-            <a:pPr algn="l">
-              <a:buFont typeface="Arial" panose="020B0604020202020204" pitchFamily="34" charset="0"/>
-              <a:buChar char="•"/>
-            </a:pPr>
-            <a:r>
-              <a:rPr lang="en-GB" b="0" i="0" dirty="0">
-                <a:solidFill>
-                  <a:srgbClr val="1D1C1D"/>
-                </a:solidFill>
-                <a:effectLst/>
-                <a:latin typeface="Slack-Lato"/>
-              </a:rPr>
-              <a:t>May underrepresent availability in certain neighbourhoods</a:t>
-            </a:r>
-          </a:p>
-          <a:p>
-            <a:pPr algn="l">
-              <a:buFont typeface="Arial" panose="020B0604020202020204" pitchFamily="34" charset="0"/>
-              <a:buChar char="•"/>
-            </a:pPr>
-            <a:r>
-              <a:rPr lang="en-GB" b="0" i="0" dirty="0">
-                <a:solidFill>
-                  <a:srgbClr val="1D1C1D"/>
-                </a:solidFill>
-                <a:effectLst/>
-                <a:latin typeface="Slack-Lato"/>
-              </a:rPr>
-              <a:t>Non-responsive towns likely outdated - however, we have cleaned the data </a:t>
-            </a:r>
-            <a:r>
-              <a:rPr lang="en-GB" b="0" i="0" dirty="0" err="1">
-                <a:solidFill>
-                  <a:srgbClr val="1D1C1D"/>
-                </a:solidFill>
-                <a:effectLst/>
-                <a:latin typeface="Slack-Lato"/>
-              </a:rPr>
-              <a:t>sn</a:t>
-            </a:r>
-            <a:endParaRPr lang="en-GB" b="0" i="0" dirty="0">
-              <a:solidFill>
-                <a:srgbClr val="1D1C1D"/>
-              </a:solidFill>
-              <a:effectLst/>
-              <a:latin typeface="Slack-Lato"/>
-            </a:endParaRPr>
-          </a:p>
-          <a:p>
-            <a:pPr algn="l"/>
-            <a:r>
-              <a:rPr lang="en-GB" b="0" i="0" dirty="0">
-                <a:solidFill>
-                  <a:srgbClr val="1D1C1D"/>
-                </a:solidFill>
-                <a:effectLst/>
-                <a:latin typeface="Slack-Lato"/>
-              </a:rPr>
-              <a:t>Access control:</a:t>
-            </a:r>
-            <a:br>
-              <a:rPr lang="en-GB" b="0" i="0" dirty="0">
-                <a:solidFill>
-                  <a:srgbClr val="1D1C1D"/>
-                </a:solidFill>
-                <a:effectLst/>
-                <a:latin typeface="Slack-Lato"/>
-              </a:rPr>
-            </a:br>
-            <a:endParaRPr lang="en-GB" b="0" i="0" dirty="0">
-              <a:solidFill>
-                <a:srgbClr val="1D1C1D"/>
-              </a:solidFill>
-              <a:effectLst/>
-              <a:latin typeface="Slack-Lato"/>
-            </a:endParaRPr>
-          </a:p>
-          <a:p>
-            <a:pPr algn="l">
-              <a:buFont typeface="Arial" panose="020B0604020202020204" pitchFamily="34" charset="0"/>
-              <a:buChar char="•"/>
-            </a:pPr>
-            <a:r>
-              <a:rPr lang="en-GB" b="0" i="0" dirty="0">
-                <a:solidFill>
-                  <a:srgbClr val="1D1C1D"/>
-                </a:solidFill>
-                <a:effectLst/>
-                <a:latin typeface="Slack-Lato"/>
-              </a:rPr>
-              <a:t>Contains sensitive details requiring access controls</a:t>
-            </a:r>
-          </a:p>
-          <a:p>
-            <a:pPr algn="l">
-              <a:buFont typeface="Arial" panose="020B0604020202020204" pitchFamily="34" charset="0"/>
-              <a:buChar char="•"/>
-            </a:pPr>
-            <a:r>
-              <a:rPr lang="en-GB" b="0" i="0" dirty="0">
-                <a:solidFill>
-                  <a:srgbClr val="1D1C1D"/>
-                </a:solidFill>
-                <a:effectLst/>
-                <a:latin typeface="Slack-Lato"/>
-              </a:rPr>
-              <a:t>Limit access to authorized users</a:t>
-            </a:r>
-          </a:p>
-          <a:p>
-            <a:pPr algn="l"/>
-            <a:r>
-              <a:rPr lang="en-GB" b="0" i="0" dirty="0">
-                <a:solidFill>
-                  <a:srgbClr val="1D1C1D"/>
-                </a:solidFill>
-                <a:effectLst/>
-                <a:latin typeface="Slack-Lato"/>
-              </a:rPr>
-              <a:t>Transparency:</a:t>
-            </a:r>
-            <a:br>
-              <a:rPr lang="en-GB" b="0" i="0" dirty="0">
-                <a:solidFill>
-                  <a:srgbClr val="1D1C1D"/>
-                </a:solidFill>
-                <a:effectLst/>
-                <a:latin typeface="Slack-Lato"/>
-              </a:rPr>
-            </a:br>
-            <a:endParaRPr lang="en-GB" b="0" i="0" dirty="0">
-              <a:solidFill>
-                <a:srgbClr val="1D1C1D"/>
-              </a:solidFill>
-              <a:effectLst/>
-              <a:latin typeface="Slack-Lato"/>
-            </a:endParaRPr>
-          </a:p>
-          <a:p>
-            <a:pPr algn="l">
-              <a:buFont typeface="Arial" panose="020B0604020202020204" pitchFamily="34" charset="0"/>
-              <a:buChar char="•"/>
-            </a:pPr>
-            <a:r>
-              <a:rPr lang="en-GB" b="0" i="0" dirty="0">
-                <a:solidFill>
-                  <a:srgbClr val="1D1C1D"/>
-                </a:solidFill>
-                <a:effectLst/>
-                <a:latin typeface="Slack-Lato"/>
-              </a:rPr>
-              <a:t>Disclose details on intended use of published list and also any limitations of the data</a:t>
-            </a:r>
-          </a:p>
-          <a:p>
-            <a:pPr algn="l">
-              <a:buFont typeface="Arial" panose="020B0604020202020204" pitchFamily="34" charset="0"/>
-              <a:buChar char="•"/>
-            </a:pPr>
-            <a:r>
-              <a:rPr lang="en-GB" b="0" i="0" dirty="0">
-                <a:solidFill>
-                  <a:srgbClr val="1D1C1D"/>
-                </a:solidFill>
-                <a:effectLst/>
-                <a:latin typeface="Slack-Lato"/>
-              </a:rPr>
-              <a:t>Explain ranking and appeals process</a:t>
-            </a:r>
-          </a:p>
-          <a:p>
-            <a:pPr algn="l"/>
-            <a:r>
-              <a:rPr lang="en-GB" b="0" i="0" dirty="0">
-                <a:solidFill>
-                  <a:srgbClr val="1D1C1D"/>
-                </a:solidFill>
-                <a:effectLst/>
-                <a:latin typeface="Slack-Lato"/>
-              </a:rPr>
-              <a:t>Accuracy:</a:t>
-            </a:r>
-            <a:br>
-              <a:rPr lang="en-GB" b="0" i="0" dirty="0">
-                <a:solidFill>
-                  <a:srgbClr val="1D1C1D"/>
-                </a:solidFill>
-                <a:effectLst/>
-                <a:latin typeface="Slack-Lato"/>
-              </a:rPr>
-            </a:br>
-            <a:endParaRPr lang="en-GB" b="0" i="0" dirty="0">
-              <a:solidFill>
-                <a:srgbClr val="1D1C1D"/>
-              </a:solidFill>
-              <a:effectLst/>
-              <a:latin typeface="Slack-Lato"/>
-            </a:endParaRPr>
-          </a:p>
-          <a:p>
-            <a:pPr algn="l">
-              <a:buFont typeface="Arial" panose="020B0604020202020204" pitchFamily="34" charset="0"/>
-              <a:buChar char="•"/>
-            </a:pPr>
-            <a:r>
-              <a:rPr lang="en-GB" b="0" i="0" dirty="0">
-                <a:solidFill>
-                  <a:srgbClr val="1D1C1D"/>
-                </a:solidFill>
-                <a:effectLst/>
-                <a:latin typeface="Slack-Lato"/>
-              </a:rPr>
-              <a:t>Data compiled from multiple government sources</a:t>
-            </a:r>
-          </a:p>
-          <a:p>
-            <a:pPr algn="l">
-              <a:buFont typeface="Arial" panose="020B0604020202020204" pitchFamily="34" charset="0"/>
-              <a:buChar char="•"/>
-            </a:pPr>
-            <a:r>
-              <a:rPr lang="en-GB" b="0" i="0" dirty="0">
-                <a:solidFill>
-                  <a:srgbClr val="1D1C1D"/>
-                </a:solidFill>
-                <a:effectLst/>
-                <a:latin typeface="Slack-Lato"/>
-              </a:rPr>
-              <a:t>Variability in municipal response affects consistency</a:t>
-            </a:r>
-          </a:p>
-          <a:p>
-            <a:pPr algn="l"/>
-            <a:r>
-              <a:rPr lang="en-GB" b="0" i="0" dirty="0">
-                <a:solidFill>
-                  <a:srgbClr val="1D1C1D"/>
-                </a:solidFill>
-                <a:effectLst/>
-                <a:latin typeface="Slack-Lato"/>
-              </a:rPr>
-              <a:t>Interpretation:</a:t>
-            </a:r>
-            <a:br>
-              <a:rPr lang="en-GB" b="0" i="0" dirty="0">
-                <a:solidFill>
-                  <a:srgbClr val="1D1C1D"/>
-                </a:solidFill>
-                <a:effectLst/>
-                <a:latin typeface="Slack-Lato"/>
-              </a:rPr>
-            </a:br>
-            <a:endParaRPr lang="en-GB" b="0" i="0" dirty="0">
-              <a:solidFill>
-                <a:srgbClr val="1D1C1D"/>
-              </a:solidFill>
-              <a:effectLst/>
-              <a:latin typeface="Slack-Lato"/>
-            </a:endParaRPr>
-          </a:p>
-          <a:p>
-            <a:pPr algn="l">
-              <a:buFont typeface="Arial" panose="020B0604020202020204" pitchFamily="34" charset="0"/>
-              <a:buChar char="•"/>
-            </a:pPr>
-            <a:r>
-              <a:rPr lang="en-GB" b="0" i="0" dirty="0">
-                <a:solidFill>
-                  <a:srgbClr val="1D1C1D"/>
-                </a:solidFill>
-                <a:effectLst/>
-                <a:latin typeface="Slack-Lato"/>
-              </a:rPr>
-              <a:t>We have provided context on what data does/doesn't indicate in order to avoid sweeping generalizations</a:t>
-            </a:r>
-          </a:p>
-          <a:p>
-            <a:pPr algn="l"/>
-            <a:r>
-              <a:rPr lang="en-GB" b="0" i="0" dirty="0">
-                <a:solidFill>
-                  <a:srgbClr val="1D1C1D"/>
-                </a:solidFill>
-                <a:effectLst/>
-                <a:latin typeface="Slack-Lato"/>
-              </a:rPr>
-              <a:t>Harm prevention:</a:t>
-            </a:r>
-            <a:br>
-              <a:rPr lang="en-GB" b="0" i="0" dirty="0">
-                <a:solidFill>
-                  <a:srgbClr val="1D1C1D"/>
-                </a:solidFill>
-                <a:effectLst/>
-                <a:latin typeface="Slack-Lato"/>
-              </a:rPr>
-            </a:br>
-            <a:endParaRPr lang="en-GB" b="0" i="0" dirty="0">
-              <a:solidFill>
-                <a:srgbClr val="1D1C1D"/>
-              </a:solidFill>
-              <a:effectLst/>
-              <a:latin typeface="Slack-Lato"/>
-            </a:endParaRPr>
-          </a:p>
-          <a:p>
-            <a:pPr algn="l">
-              <a:buFont typeface="Arial" panose="020B0604020202020204" pitchFamily="34" charset="0"/>
-              <a:buChar char="•"/>
-            </a:pPr>
-            <a:r>
-              <a:rPr lang="en-GB" b="0" i="0" dirty="0">
-                <a:solidFill>
-                  <a:srgbClr val="1D1C1D"/>
-                </a:solidFill>
-                <a:effectLst/>
-                <a:latin typeface="Slack-Lato"/>
-              </a:rPr>
-              <a:t>Mitigate risks of misuse or stereotyping</a:t>
-            </a:r>
-          </a:p>
-          <a:p>
-            <a:pPr algn="l">
-              <a:buFont typeface="Arial" panose="020B0604020202020204" pitchFamily="34" charset="0"/>
-              <a:buChar char="•"/>
-            </a:pPr>
-            <a:r>
-              <a:rPr lang="en-GB" b="0" i="0" dirty="0">
-                <a:solidFill>
-                  <a:srgbClr val="1D1C1D"/>
-                </a:solidFill>
-                <a:effectLst/>
-                <a:latin typeface="Slack-Lato"/>
-              </a:rPr>
-              <a:t>Avoid penalizing municipalities</a:t>
-            </a:r>
-          </a:p>
-          <a:p>
-            <a:pPr algn="l"/>
-            <a:r>
-              <a:rPr lang="en-GB" b="0" i="0" dirty="0">
-                <a:solidFill>
-                  <a:srgbClr val="1D1C1D"/>
-                </a:solidFill>
-                <a:effectLst/>
-                <a:latin typeface="Slack-Lato"/>
-              </a:rPr>
-              <a:t>Data Source Variation</a:t>
-            </a:r>
-            <a:br>
-              <a:rPr lang="en-GB" b="0" i="0" dirty="0">
-                <a:solidFill>
-                  <a:srgbClr val="1D1C1D"/>
-                </a:solidFill>
-                <a:effectLst/>
-                <a:latin typeface="Slack-Lato"/>
-              </a:rPr>
-            </a:br>
-            <a:endParaRPr lang="en-GB" b="0" i="0" dirty="0">
-              <a:solidFill>
-                <a:srgbClr val="1D1C1D"/>
-              </a:solidFill>
-              <a:effectLst/>
-              <a:latin typeface="Slack-Lato"/>
-            </a:endParaRPr>
-          </a:p>
-          <a:p>
-            <a:pPr algn="l">
-              <a:buFont typeface="Arial" panose="020B0604020202020204" pitchFamily="34" charset="0"/>
-              <a:buChar char="•"/>
-            </a:pPr>
-            <a:r>
-              <a:rPr lang="en-GB" b="0" i="0" dirty="0">
-                <a:solidFill>
-                  <a:srgbClr val="1D1C1D"/>
-                </a:solidFill>
-                <a:effectLst/>
-                <a:latin typeface="Slack-Lato"/>
-              </a:rPr>
-              <a:t>The data originates from diverse sources, including federal, state, and local programs, which may lead to inconsistencies and inaccuracies due to variations in reporting standards.</a:t>
-            </a:r>
-          </a:p>
-          <a:p>
-            <a:pPr algn="l"/>
-            <a:r>
-              <a:rPr lang="en-GB" b="0" i="0" dirty="0">
-                <a:solidFill>
-                  <a:srgbClr val="1D1C1D"/>
-                </a:solidFill>
-                <a:effectLst/>
-                <a:latin typeface="Slack-Lato"/>
-              </a:rPr>
-              <a:t>Dataset 3Data Specificity</a:t>
-            </a:r>
-            <a:br>
-              <a:rPr lang="en-GB" b="0" i="0" dirty="0">
-                <a:solidFill>
-                  <a:srgbClr val="1D1C1D"/>
-                </a:solidFill>
-                <a:effectLst/>
-                <a:latin typeface="Slack-Lato"/>
-              </a:rPr>
-            </a:br>
-            <a:endParaRPr lang="en-GB" b="0" i="0" dirty="0">
-              <a:solidFill>
-                <a:srgbClr val="1D1C1D"/>
-              </a:solidFill>
-              <a:effectLst/>
-              <a:latin typeface="Slack-Lato"/>
-            </a:endParaRPr>
-          </a:p>
-          <a:p>
-            <a:pPr algn="l">
-              <a:buFont typeface="Arial" panose="020B0604020202020204" pitchFamily="34" charset="0"/>
-              <a:buChar char="•"/>
-            </a:pPr>
-            <a:r>
-              <a:rPr lang="en-GB" b="0" i="0" dirty="0">
-                <a:solidFill>
-                  <a:srgbClr val="1D1C1D"/>
-                </a:solidFill>
-                <a:effectLst/>
-                <a:latin typeface="Slack-Lato"/>
-              </a:rPr>
-              <a:t>The dataset provides information for the fiscal year 2019 only, limiting insights to that specific timeframe.</a:t>
-            </a:r>
-          </a:p>
-          <a:p>
-            <a:pPr algn="l"/>
-            <a:r>
-              <a:rPr lang="en-GB" b="0" i="0" dirty="0">
-                <a:solidFill>
-                  <a:srgbClr val="1D1C1D"/>
-                </a:solidFill>
-                <a:effectLst/>
-                <a:latin typeface="Slack-Lato"/>
-              </a:rPr>
-              <a:t>Limited Context</a:t>
-            </a:r>
-            <a:br>
-              <a:rPr lang="en-GB" b="0" i="0" dirty="0">
-                <a:solidFill>
-                  <a:srgbClr val="1D1C1D"/>
-                </a:solidFill>
-                <a:effectLst/>
-                <a:latin typeface="Slack-Lato"/>
-              </a:rPr>
-            </a:br>
-            <a:endParaRPr lang="en-GB" b="0" i="0" dirty="0">
-              <a:solidFill>
-                <a:srgbClr val="1D1C1D"/>
-              </a:solidFill>
-              <a:effectLst/>
-              <a:latin typeface="Slack-Lato"/>
-            </a:endParaRPr>
-          </a:p>
-          <a:p>
-            <a:pPr algn="l">
-              <a:buFont typeface="Arial" panose="020B0604020202020204" pitchFamily="34" charset="0"/>
-              <a:buChar char="•"/>
-            </a:pPr>
-            <a:r>
-              <a:rPr lang="en-GB" b="0" i="0" dirty="0">
-                <a:solidFill>
-                  <a:srgbClr val="1D1C1D"/>
-                </a:solidFill>
-                <a:effectLst/>
-                <a:latin typeface="Slack-Lato"/>
-              </a:rPr>
-              <a:t>The dataset offers numerical data without extensive context, which may require additional information for comprehensive analysis.</a:t>
-            </a:r>
-          </a:p>
-          <a:p>
-            <a:pPr algn="l"/>
-            <a:r>
-              <a:rPr lang="en-GB" b="0" i="0" dirty="0">
-                <a:solidFill>
-                  <a:srgbClr val="1D1C1D"/>
-                </a:solidFill>
-                <a:effectLst/>
-                <a:latin typeface="Slack-Lato"/>
-              </a:rPr>
-              <a:t>Potential for Oversimplification:</a:t>
-            </a:r>
-            <a:br>
-              <a:rPr lang="en-GB" b="0" i="0" dirty="0">
-                <a:solidFill>
-                  <a:srgbClr val="1D1C1D"/>
-                </a:solidFill>
-                <a:effectLst/>
-                <a:latin typeface="Slack-Lato"/>
-              </a:rPr>
-            </a:br>
-            <a:endParaRPr lang="en-GB" b="0" i="0" dirty="0">
-              <a:solidFill>
-                <a:srgbClr val="1D1C1D"/>
-              </a:solidFill>
-              <a:effectLst/>
-              <a:latin typeface="Slack-Lato"/>
-            </a:endParaRPr>
-          </a:p>
-          <a:p>
-            <a:pPr algn="l">
-              <a:buFont typeface="Arial" panose="020B0604020202020204" pitchFamily="34" charset="0"/>
-              <a:buChar char="•"/>
-            </a:pPr>
-            <a:r>
-              <a:rPr lang="en-GB" b="0" i="0" dirty="0">
-                <a:solidFill>
-                  <a:srgbClr val="1D1C1D"/>
-                </a:solidFill>
-                <a:effectLst/>
-                <a:latin typeface="Slack-Lato"/>
-              </a:rPr>
-              <a:t> The dataset's limited variables may oversimplify complex financial situations of the entities involved.</a:t>
-            </a:r>
-          </a:p>
-          <a:p>
-            <a:pPr algn="l">
-              <a:buFont typeface="Arial" panose="020B0604020202020204" pitchFamily="34" charset="0"/>
-              <a:buChar char="•"/>
-            </a:pPr>
-            <a:r>
-              <a:rPr lang="en-GB" b="0" i="0" dirty="0">
-                <a:solidFill>
-                  <a:srgbClr val="1D1C1D"/>
-                </a:solidFill>
-                <a:effectLst/>
-                <a:latin typeface="Slack-Lato"/>
-              </a:rPr>
-              <a:t>Dataset excludes other potentially relevant factors outside retirement contributions</a:t>
-            </a:r>
-          </a:p>
-          <a:p>
-            <a:pPr algn="l"/>
-            <a:r>
-              <a:rPr lang="en-GB" b="0" i="0" dirty="0">
-                <a:solidFill>
-                  <a:srgbClr val="1D1C1D"/>
-                </a:solidFill>
-                <a:effectLst/>
-                <a:latin typeface="Slack-Lato"/>
-              </a:rPr>
-              <a:t>PII</a:t>
-            </a:r>
-            <a:br>
-              <a:rPr lang="en-GB" b="0" i="0" dirty="0">
-                <a:solidFill>
-                  <a:srgbClr val="1D1C1D"/>
-                </a:solidFill>
-                <a:effectLst/>
-                <a:latin typeface="Slack-Lato"/>
-              </a:rPr>
-            </a:br>
-            <a:endParaRPr lang="en-GB" b="0" i="0" dirty="0">
-              <a:solidFill>
-                <a:srgbClr val="1D1C1D"/>
-              </a:solidFill>
-              <a:effectLst/>
-              <a:latin typeface="Slack-Lato"/>
-            </a:endParaRPr>
-          </a:p>
-          <a:p>
-            <a:pPr algn="l">
-              <a:buFont typeface="Arial" panose="020B0604020202020204" pitchFamily="34" charset="0"/>
-              <a:buChar char="•"/>
-            </a:pPr>
-            <a:r>
-              <a:rPr lang="en-GB" b="0" i="0" dirty="0">
-                <a:solidFill>
-                  <a:srgbClr val="1D1C1D"/>
-                </a:solidFill>
-                <a:effectLst/>
-                <a:latin typeface="Slack-Lato"/>
-              </a:rPr>
-              <a:t>Doesn’t contain PII</a:t>
-            </a:r>
-          </a:p>
-          <a:p>
-            <a:pPr algn="l"/>
-            <a:r>
-              <a:rPr lang="en-GB" b="0" i="0" dirty="0">
-                <a:solidFill>
-                  <a:srgbClr val="1D1C1D"/>
-                </a:solidFill>
-                <a:effectLst/>
-                <a:latin typeface="Slack-Lato"/>
-              </a:rPr>
-              <a:t>Collection consent</a:t>
-            </a:r>
-          </a:p>
-          <a:p>
-            <a:pPr algn="l">
-              <a:buFont typeface="Arial" panose="020B0604020202020204" pitchFamily="34" charset="0"/>
-              <a:buChar char="•"/>
-            </a:pPr>
-            <a:r>
-              <a:rPr lang="en-GB" b="0" i="0" dirty="0">
-                <a:solidFill>
-                  <a:srgbClr val="1D1C1D"/>
-                </a:solidFill>
-                <a:effectLst/>
-                <a:latin typeface="Slack-Lato"/>
-              </a:rPr>
-              <a:t>Individual consent isn’t required as the data pertains to organizational and financial aspects rather than personal information about individuals.</a:t>
-            </a:r>
-          </a:p>
-          <a:p>
             <a:endParaRPr lang="en-GB" dirty="0"/>
           </a:p>
         </p:txBody>
@@ -2545,7 +2076,7 @@
           <a:p>
             <a:fld id="{FB415740-FCD3-4E21-A5B7-7BFB09A225C5}" type="datetimeFigureOut">
               <a:rPr lang="en-GB" smtClean="0"/>
-              <a:t>14/08/2023</a:t>
+              <a:t>15/08/2023</a:t>
             </a:fld>
             <a:endParaRPr lang="en-GB"/>
           </a:p>
@@ -2745,7 +2276,7 @@
           <a:p>
             <a:fld id="{FB415740-FCD3-4E21-A5B7-7BFB09A225C5}" type="datetimeFigureOut">
               <a:rPr lang="en-GB" smtClean="0"/>
-              <a:t>14/08/2023</a:t>
+              <a:t>15/08/2023</a:t>
             </a:fld>
             <a:endParaRPr lang="en-GB"/>
           </a:p>
@@ -2955,7 +2486,7 @@
           <a:p>
             <a:fld id="{FB415740-FCD3-4E21-A5B7-7BFB09A225C5}" type="datetimeFigureOut">
               <a:rPr lang="en-GB" smtClean="0"/>
-              <a:t>14/08/2023</a:t>
+              <a:t>15/08/2023</a:t>
             </a:fld>
             <a:endParaRPr lang="en-GB"/>
           </a:p>
@@ -3155,7 +2686,7 @@
           <a:p>
             <a:fld id="{FB415740-FCD3-4E21-A5B7-7BFB09A225C5}" type="datetimeFigureOut">
               <a:rPr lang="en-GB" smtClean="0"/>
-              <a:t>14/08/2023</a:t>
+              <a:t>15/08/2023</a:t>
             </a:fld>
             <a:endParaRPr lang="en-GB"/>
           </a:p>
@@ -3431,7 +2962,7 @@
           <a:p>
             <a:fld id="{FB415740-FCD3-4E21-A5B7-7BFB09A225C5}" type="datetimeFigureOut">
               <a:rPr lang="en-GB" smtClean="0"/>
-              <a:t>14/08/2023</a:t>
+              <a:t>15/08/2023</a:t>
             </a:fld>
             <a:endParaRPr lang="en-GB"/>
           </a:p>
@@ -3699,7 +3230,7 @@
           <a:p>
             <a:fld id="{FB415740-FCD3-4E21-A5B7-7BFB09A225C5}" type="datetimeFigureOut">
               <a:rPr lang="en-GB" smtClean="0"/>
-              <a:t>14/08/2023</a:t>
+              <a:t>15/08/2023</a:t>
             </a:fld>
             <a:endParaRPr lang="en-GB"/>
           </a:p>
@@ -4114,7 +3645,7 @@
           <a:p>
             <a:fld id="{FB415740-FCD3-4E21-A5B7-7BFB09A225C5}" type="datetimeFigureOut">
               <a:rPr lang="en-GB" smtClean="0"/>
-              <a:t>14/08/2023</a:t>
+              <a:t>15/08/2023</a:t>
             </a:fld>
             <a:endParaRPr lang="en-GB"/>
           </a:p>
@@ -4256,7 +3787,7 @@
           <a:p>
             <a:fld id="{FB415740-FCD3-4E21-A5B7-7BFB09A225C5}" type="datetimeFigureOut">
               <a:rPr lang="en-GB" smtClean="0"/>
-              <a:t>14/08/2023</a:t>
+              <a:t>15/08/2023</a:t>
             </a:fld>
             <a:endParaRPr lang="en-GB"/>
           </a:p>
@@ -4369,7 +3900,7 @@
           <a:p>
             <a:fld id="{FB415740-FCD3-4E21-A5B7-7BFB09A225C5}" type="datetimeFigureOut">
               <a:rPr lang="en-GB" smtClean="0"/>
-              <a:t>14/08/2023</a:t>
+              <a:t>15/08/2023</a:t>
             </a:fld>
             <a:endParaRPr lang="en-GB"/>
           </a:p>
@@ -4682,7 +4213,7 @@
           <a:p>
             <a:fld id="{FB415740-FCD3-4E21-A5B7-7BFB09A225C5}" type="datetimeFigureOut">
               <a:rPr lang="en-GB" smtClean="0"/>
-              <a:t>14/08/2023</a:t>
+              <a:t>15/08/2023</a:t>
             </a:fld>
             <a:endParaRPr lang="en-GB"/>
           </a:p>
@@ -4971,7 +4502,7 @@
           <a:p>
             <a:fld id="{FB415740-FCD3-4E21-A5B7-7BFB09A225C5}" type="datetimeFigureOut">
               <a:rPr lang="en-GB" smtClean="0"/>
-              <a:t>14/08/2023</a:t>
+              <a:t>15/08/2023</a:t>
             </a:fld>
             <a:endParaRPr lang="en-GB"/>
           </a:p>
@@ -5214,7 +4745,7 @@
           <a:p>
             <a:fld id="{FB415740-FCD3-4E21-A5B7-7BFB09A225C5}" type="datetimeFigureOut">
               <a:rPr lang="en-GB" smtClean="0"/>
-              <a:t>14/08/2023</a:t>
+              <a:t>15/08/2023</a:t>
             </a:fld>
             <a:endParaRPr lang="en-GB"/>
           </a:p>
@@ -9105,10 +8636,10 @@
       </p:sp>
       <p:pic>
         <p:nvPicPr>
-          <p:cNvPr id="5" name="Picture 4">
-            <a:extLst>
-              <a:ext uri="{FF2B5EF4-FFF2-40B4-BE49-F238E27FC236}">
-                <a16:creationId xmlns:a16="http://schemas.microsoft.com/office/drawing/2014/main" id="{7D07E919-DBAD-451C-FC12-8802021FB3EE}"/>
+          <p:cNvPr id="7" name="Picture 6">
+            <a:extLst>
+              <a:ext uri="{FF2B5EF4-FFF2-40B4-BE49-F238E27FC236}">
+                <a16:creationId xmlns:a16="http://schemas.microsoft.com/office/drawing/2014/main" id="{8640186A-CE86-0A8F-01FF-F1C1ECF2773D}"/>
               </a:ext>
             </a:extLst>
           </p:cNvPr>
@@ -9125,7 +8656,7 @@
                 <a14:imgProps xmlns:a14="http://schemas.microsoft.com/office/drawing/2010/main">
                   <a14:imgLayer r:embed="rId5">
                     <a14:imgEffect>
-                      <a14:saturation sat="33000"/>
+                      <a14:sharpenSoften amount="50000"/>
                     </a14:imgEffect>
                   </a14:imgLayer>
                 </a14:imgProps>
@@ -9138,8 +8669,8 @@
         </p:blipFill>
         <p:spPr>
           <a:xfrm>
-            <a:off x="2183788" y="1825625"/>
-            <a:ext cx="7191375" cy="3867150"/>
+            <a:off x="2176712" y="2109787"/>
+            <a:ext cx="7357497" cy="2979571"/>
           </a:xfrm>
           <a:prstGeom prst="rect">
             <a:avLst/>

</xml_diff>